<commit_message>
Adding #2 slide, and references
</commit_message>
<xml_diff>
--- a/Slides/0. Introduction OSS.pptx
+++ b/Slides/0. Introduction OSS.pptx
@@ -8,7 +8,7 @@
     <p:notesMasterId r:id="rId24"/>
   </p:notesMasterIdLst>
   <p:sldIdLst>
-    <p:sldId id="370" r:id="rId2"/>
+    <p:sldId id="399" r:id="rId2"/>
     <p:sldId id="387" r:id="rId3"/>
     <p:sldId id="390" r:id="rId4"/>
     <p:sldId id="398" r:id="rId5"/>
@@ -218,7 +218,7 @@
           <a:p>
             <a:fld id="{3A51E6CB-1B67-49CD-819C-CBD1F8F15839}" type="datetimeFigureOut">
               <a:rPr lang="ko-KR" altLang="en-US" smtClean="0"/>
-              <a:t>2019-09-02</a:t>
+              <a:t>2019-09-05</a:t>
             </a:fld>
             <a:endParaRPr lang="ko-KR" altLang="en-US"/>
           </a:p>
@@ -700,7 +700,7 @@
           <a:p>
             <a:fld id="{1EA80F27-E9B9-4A8E-9A59-01CCB3F43850}" type="datetime1">
               <a:rPr lang="ko-KR" altLang="en-US" smtClean="0"/>
-              <a:t>2019-09-02</a:t>
+              <a:t>2019-09-05</a:t>
             </a:fld>
             <a:endParaRPr lang="ko-KR" altLang="en-US"/>
           </a:p>
@@ -916,7 +916,7 @@
           <a:p>
             <a:fld id="{7E5363F8-22A8-407F-82B0-EFC1D1C22895}" type="datetime1">
               <a:rPr lang="ko-KR" altLang="en-US" smtClean="0"/>
-              <a:t>2019-09-02</a:t>
+              <a:t>2019-09-05</a:t>
             </a:fld>
             <a:endParaRPr lang="ko-KR" altLang="en-US"/>
           </a:p>
@@ -1096,7 +1096,7 @@
           <a:p>
             <a:fld id="{8187739B-8E74-4F06-BBD0-F6D670C1F7A1}" type="datetime1">
               <a:rPr lang="ko-KR" altLang="en-US" smtClean="0"/>
-              <a:t>2019-09-02</a:t>
+              <a:t>2019-09-05</a:t>
             </a:fld>
             <a:endParaRPr lang="ko-KR" altLang="en-US"/>
           </a:p>
@@ -1266,7 +1266,7 @@
           <a:p>
             <a:fld id="{947C39E4-F1C0-46F5-93CB-857C8C3AEB8D}" type="datetime1">
               <a:rPr lang="ko-KR" altLang="en-US" smtClean="0"/>
-              <a:t>2019-09-02</a:t>
+              <a:t>2019-09-05</a:t>
             </a:fld>
             <a:endParaRPr lang="ko-KR" altLang="en-US"/>
           </a:p>
@@ -1510,7 +1510,7 @@
           <a:p>
             <a:fld id="{7818271D-E6C7-4286-B2FD-D9AA53F1E428}" type="datetime1">
               <a:rPr lang="ko-KR" altLang="en-US" smtClean="0"/>
-              <a:t>2019-09-02</a:t>
+              <a:t>2019-09-05</a:t>
             </a:fld>
             <a:endParaRPr lang="ko-KR" altLang="en-US"/>
           </a:p>
@@ -1742,7 +1742,7 @@
           <a:p>
             <a:fld id="{8CE3C26B-F624-420D-BF9D-391E2E695B27}" type="datetime1">
               <a:rPr lang="ko-KR" altLang="en-US" smtClean="0"/>
-              <a:t>2019-09-02</a:t>
+              <a:t>2019-09-05</a:t>
             </a:fld>
             <a:endParaRPr lang="ko-KR" altLang="en-US"/>
           </a:p>
@@ -2109,7 +2109,7 @@
           <a:p>
             <a:fld id="{A1FC83CE-7AD5-4A20-9998-54C7F9F05545}" type="datetime1">
               <a:rPr lang="ko-KR" altLang="en-US" smtClean="0"/>
-              <a:t>2019-09-02</a:t>
+              <a:t>2019-09-05</a:t>
             </a:fld>
             <a:endParaRPr lang="ko-KR" altLang="en-US"/>
           </a:p>
@@ -2227,7 +2227,7 @@
           <a:p>
             <a:fld id="{3A3E22EA-EB96-4ADF-ABA9-A693E5F7BB1E}" type="datetime1">
               <a:rPr lang="ko-KR" altLang="en-US" smtClean="0"/>
-              <a:t>2019-09-02</a:t>
+              <a:t>2019-09-05</a:t>
             </a:fld>
             <a:endParaRPr lang="ko-KR" altLang="en-US"/>
           </a:p>
@@ -2322,7 +2322,7 @@
           <a:p>
             <a:fld id="{0D5BD961-86A8-440A-8C4E-52B6CA6FECED}" type="datetime1">
               <a:rPr lang="ko-KR" altLang="en-US" smtClean="0"/>
-              <a:t>2019-09-02</a:t>
+              <a:t>2019-09-05</a:t>
             </a:fld>
             <a:endParaRPr lang="ko-KR" altLang="en-US"/>
           </a:p>
@@ -2599,7 +2599,7 @@
           <a:p>
             <a:fld id="{CD151CC0-1347-483B-8708-01772054FA68}" type="datetime1">
               <a:rPr lang="ko-KR" altLang="en-US" smtClean="0"/>
-              <a:t>2019-09-02</a:t>
+              <a:t>2019-09-05</a:t>
             </a:fld>
             <a:endParaRPr lang="ko-KR" altLang="en-US"/>
           </a:p>
@@ -2856,7 +2856,7 @@
           <a:p>
             <a:fld id="{57185993-49E6-4096-BF26-930E741DA796}" type="datetime1">
               <a:rPr lang="ko-KR" altLang="en-US" smtClean="0"/>
-              <a:t>2019-09-02</a:t>
+              <a:t>2019-09-05</a:t>
             </a:fld>
             <a:endParaRPr lang="ko-KR" altLang="en-US"/>
           </a:p>
@@ -3072,7 +3072,7 @@
           <a:p>
             <a:fld id="{170798F3-F6A9-4876-8D5A-30BE2843F4A2}" type="datetime1">
               <a:rPr lang="ko-KR" altLang="en-US" smtClean="0"/>
-              <a:t>2019-09-02</a:t>
+              <a:t>2019-09-05</a:t>
             </a:fld>
             <a:endParaRPr lang="ko-KR" altLang="en-US"/>
           </a:p>
@@ -3633,6 +3633,21 @@
               <a:rPr lang="en-US" altLang="ko-KR" sz="4400" dirty="0"/>
               <a:t>Development</a:t>
             </a:r>
+            <a:br>
+              <a:rPr lang="en-US" altLang="ko-KR" sz="4400" dirty="0"/>
+            </a:br>
+            <a:r>
+              <a:rPr lang="en-US" altLang="ko-KR" sz="3200" dirty="0"/>
+              <a:t>2</a:t>
+            </a:r>
+            <a:r>
+              <a:rPr lang="en-US" altLang="ko-KR" sz="3200" baseline="30000" dirty="0"/>
+              <a:t>nd</a:t>
+            </a:r>
+            <a:r>
+              <a:rPr lang="en-US" altLang="ko-KR" sz="3200" dirty="0"/>
+              <a:t> semester, 2019</a:t>
+            </a:r>
             <a:endParaRPr lang="ko-KR" altLang="en-US" sz="4400" dirty="0"/>
           </a:p>
         </p:txBody>
@@ -3666,9 +3681,6 @@
               </a:rPr>
               <a:t>Hyunchan, Park</a:t>
             </a:r>
-          </a:p>
-          <a:p>
-            <a:pPr lvl="0"/>
             <a:endParaRPr lang="en-US" altLang="ko-KR" sz="1000" dirty="0">
               <a:solidFill>
                 <a:prstClr val="black"/>
@@ -3681,17 +3693,13 @@
               <a:rPr lang="en-US" altLang="ko-KR" sz="2000" dirty="0">
                 <a:hlinkClick r:id="rId3"/>
               </a:rPr>
-              <a:t>http://oslab.jbnu.ac.kr/</a:t>
+              <a:t>https://github.com/hyunchan-park/osscourse</a:t>
             </a:r>
             <a:endParaRPr lang="en-US" altLang="ko-KR" sz="2000" dirty="0"/>
           </a:p>
           <a:p>
             <a:pPr lvl="0"/>
-            <a:endParaRPr lang="en-US" altLang="ko-KR" sz="700" dirty="0">
-              <a:solidFill>
-                <a:prstClr val="black"/>
-              </a:solidFill>
-            </a:endParaRPr>
+            <a:endParaRPr lang="en-US" altLang="ko-KR" sz="2000" dirty="0"/>
           </a:p>
           <a:p>
             <a:pPr lvl="0"/>
@@ -3725,10 +3733,40 @@
           </a:p>
         </p:txBody>
       </p:sp>
+      <p:pic>
+        <p:nvPicPr>
+          <p:cNvPr id="4" name="그림 3">
+            <a:extLst>
+              <a:ext uri="{FF2B5EF4-FFF2-40B4-BE49-F238E27FC236}">
+                <a16:creationId xmlns:a16="http://schemas.microsoft.com/office/drawing/2014/main" id="{8A00F39C-DC22-4E5D-8177-BBDCF42AEA39}"/>
+              </a:ext>
+            </a:extLst>
+          </p:cNvPr>
+          <p:cNvPicPr>
+            <a:picLocks noChangeAspect="1"/>
+          </p:cNvPicPr>
+          <p:nvPr/>
+        </p:nvPicPr>
+        <p:blipFill>
+          <a:blip r:embed="rId4"/>
+          <a:stretch>
+            <a:fillRect/>
+          </a:stretch>
+        </p:blipFill>
+        <p:spPr>
+          <a:xfrm>
+            <a:off x="7294780" y="6353666"/>
+            <a:ext cx="1849220" cy="504333"/>
+          </a:xfrm>
+          <a:prstGeom prst="rect">
+            <a:avLst/>
+          </a:prstGeom>
+        </p:spPr>
+      </p:pic>
     </p:spTree>
     <p:extLst>
       <p:ext uri="{BB962C8B-B14F-4D97-AF65-F5344CB8AC3E}">
-        <p14:creationId xmlns:p14="http://schemas.microsoft.com/office/powerpoint/2010/main" val="1027339931"/>
+        <p14:creationId xmlns:p14="http://schemas.microsoft.com/office/powerpoint/2010/main" val="3199406521"/>
       </p:ext>
     </p:extLst>
   </p:cSld>

</xml_diff>